<commit_message>
v4: pres and specs update
</commit_message>
<xml_diff>
--- a/v4/documentation/Presentation_v4.pptx
+++ b/v4/documentation/Presentation_v4.pptx
@@ -8,8 +8,8 @@
     <p:sldId id="256" r:id="rId2"/>
     <p:sldId id="257" r:id="rId3"/>
     <p:sldId id="260" r:id="rId4"/>
-    <p:sldId id="261" r:id="rId5"/>
-    <p:sldId id="258" r:id="rId6"/>
+    <p:sldId id="258" r:id="rId5"/>
+    <p:sldId id="261" r:id="rId6"/>
     <p:sldId id="262" r:id="rId7"/>
     <p:sldId id="259" r:id="rId8"/>
   </p:sldIdLst>
@@ -6524,14 +6524,21 @@
           <a:p>
             <a:r>
               <a:rPr lang="en-GB" dirty="0" smtClean="0"/>
-              <a:t>UI</a:t>
+              <a:t>Specifications:</a:t>
             </a:r>
             <a:br>
               <a:rPr lang="en-GB" dirty="0" smtClean="0"/>
             </a:br>
             <a:r>
               <a:rPr lang="en-GB" dirty="0" smtClean="0"/>
-              <a:t>(v4)</a:t>
+              <a:t>Development &amp; Testing</a:t>
+            </a:r>
+            <a:br>
+              <a:rPr lang="en-GB" dirty="0" smtClean="0"/>
+            </a:br>
+            <a:r>
+              <a:rPr lang="en-GB" sz="2000" dirty="0" smtClean="0"/>
+              <a:t>and effort estimates</a:t>
             </a:r>
             <a:endParaRPr lang="en-GB" dirty="0"/>
           </a:p>
@@ -6539,138 +6546,20 @@
       </p:sp>
       <p:sp>
         <p:nvSpPr>
-          <p:cNvPr id="10" name="Rectangle 9"/>
+          <p:cNvPr id="7" name="Rectangle 6"/>
           <p:cNvSpPr/>
           <p:nvPr/>
         </p:nvSpPr>
         <p:spPr>
           <a:xfrm>
-            <a:off x="3734357" y="4605131"/>
-            <a:ext cx="3228230" cy="124568"/>
+            <a:off x="1860606" y="3228231"/>
+            <a:ext cx="620201" cy="159026"/>
           </a:xfrm>
           <a:prstGeom prst="rect">
             <a:avLst/>
           </a:prstGeom>
-        </p:spPr>
-        <p:style>
-          <a:lnRef idx="2">
-            <a:schemeClr val="accent1">
-              <a:shade val="50000"/>
-            </a:schemeClr>
-          </a:lnRef>
-          <a:fillRef idx="1">
-            <a:schemeClr val="accent1"/>
-          </a:fillRef>
-          <a:effectRef idx="0">
-            <a:schemeClr val="accent1"/>
-          </a:effectRef>
-          <a:fontRef idx="minor">
-            <a:schemeClr val="lt1"/>
-          </a:fontRef>
-        </p:style>
-        <p:txBody>
-          <a:bodyPr rtlCol="0" anchor="ctr"/>
-          <a:lstStyle/>
-          <a:p>
-            <a:pPr algn="ctr"/>
-            <a:endParaRPr lang="en-GB"/>
-          </a:p>
-        </p:txBody>
-      </p:sp>
-      <p:sp>
-        <p:nvSpPr>
-          <p:cNvPr id="11" name="Rectangle 10"/>
-          <p:cNvSpPr/>
-          <p:nvPr/>
-        </p:nvSpPr>
-        <p:spPr>
-          <a:xfrm>
-            <a:off x="5351228" y="5335325"/>
-            <a:ext cx="1311965" cy="127222"/>
-          </a:xfrm>
-          <a:prstGeom prst="rect">
-            <a:avLst/>
-          </a:prstGeom>
-        </p:spPr>
-        <p:style>
-          <a:lnRef idx="2">
-            <a:schemeClr val="accent1">
-              <a:shade val="50000"/>
-            </a:schemeClr>
-          </a:lnRef>
-          <a:fillRef idx="1">
-            <a:schemeClr val="accent1"/>
-          </a:fillRef>
-          <a:effectRef idx="0">
-            <a:schemeClr val="accent1"/>
-          </a:effectRef>
-          <a:fontRef idx="minor">
-            <a:schemeClr val="lt1"/>
-          </a:fontRef>
-        </p:style>
-        <p:txBody>
-          <a:bodyPr rtlCol="0" anchor="ctr"/>
-          <a:lstStyle/>
-          <a:p>
-            <a:pPr algn="ctr"/>
-            <a:endParaRPr lang="en-GB"/>
-          </a:p>
-        </p:txBody>
-      </p:sp>
-      <p:sp>
-        <p:nvSpPr>
-          <p:cNvPr id="12" name="TextBox 11"/>
-          <p:cNvSpPr txBox="1"/>
-          <p:nvPr/>
-        </p:nvSpPr>
-        <p:spPr>
-          <a:xfrm>
-            <a:off x="4102873" y="3593990"/>
-            <a:ext cx="1757238" cy="369332"/>
-          </a:xfrm>
-          <a:prstGeom prst="rect">
-            <a:avLst/>
-          </a:prstGeom>
-          <a:noFill/>
-        </p:spPr>
-        <p:txBody>
-          <a:bodyPr wrap="square" rtlCol="0">
-            <a:spAutoFit/>
-          </a:bodyPr>
-          <a:lstStyle/>
-          <a:p>
-            <a:r>
-              <a:rPr lang="en-GB" dirty="0" smtClean="0">
-                <a:solidFill>
-                  <a:schemeClr val="bg1"/>
-                </a:solidFill>
-              </a:rPr>
-              <a:t>Capacity:</a:t>
-            </a:r>
-            <a:endParaRPr lang="en-GB" dirty="0">
-              <a:solidFill>
-                <a:schemeClr val="bg1"/>
-              </a:solidFill>
-            </a:endParaRPr>
-          </a:p>
-        </p:txBody>
-      </p:sp>
-      <p:sp>
-        <p:nvSpPr>
-          <p:cNvPr id="5" name="Rounded Rectangle 4"/>
-          <p:cNvSpPr/>
-          <p:nvPr/>
-        </p:nvSpPr>
-        <p:spPr>
-          <a:xfrm>
-            <a:off x="2226365" y="2091194"/>
-            <a:ext cx="6742706" cy="4405023"/>
-          </a:xfrm>
-          <a:prstGeom prst="roundRect">
-            <a:avLst/>
-          </a:prstGeom>
           <a:solidFill>
-            <a:schemeClr val="tx1"/>
+            <a:srgbClr val="C6EFCE"/>
           </a:solidFill>
           <a:ln>
             <a:noFill/>
@@ -6703,15 +6592,13 @@
       </p:sp>
       <p:pic>
         <p:nvPicPr>
-          <p:cNvPr id="4" name="Content Placeholder 3"/>
+          <p:cNvPr id="3" name="Picture 2"/>
           <p:cNvPicPr>
-            <a:picLocks noGrp="1" noChangeAspect="1"/>
+            <a:picLocks noChangeAspect="1"/>
           </p:cNvPicPr>
-          <p:nvPr>
-            <p:ph idx="1"/>
-          </p:nvPr>
+          <p:nvPr/>
         </p:nvPicPr>
-        <p:blipFill>
+        <p:blipFill rotWithShape="1">
           <a:blip r:embed="rId2">
             <a:extLst>
               <a:ext uri="{28A0092B-C50C-407E-A947-70E740481C1C}">
@@ -6719,21 +6606,23 @@
               </a:ext>
             </a:extLst>
           </a:blip>
-          <a:stretch>
-            <a:fillRect/>
-          </a:stretch>
+          <a:srcRect l="4190" t="33728" r="29486" b="13992"/>
+          <a:stretch/>
         </p:blipFill>
         <p:spPr>
           <a:xfrm>
-            <a:off x="2857500" y="2340769"/>
-            <a:ext cx="5438775" cy="3619500"/>
+            <a:off x="818985" y="2279114"/>
+            <a:ext cx="9517710" cy="4220012"/>
           </a:xfrm>
+          <a:prstGeom prst="rect">
+            <a:avLst/>
+          </a:prstGeom>
         </p:spPr>
       </p:pic>
     </p:spTree>
     <p:extLst>
       <p:ext uri="{BB962C8B-B14F-4D97-AF65-F5344CB8AC3E}">
-        <p14:creationId xmlns:p14="http://schemas.microsoft.com/office/powerpoint/2010/main" val="1886001182"/>
+        <p14:creationId xmlns:p14="http://schemas.microsoft.com/office/powerpoint/2010/main" val="337139409"/>
       </p:ext>
     </p:extLst>
   </p:cSld>
@@ -6784,21 +6673,14 @@
           <a:p>
             <a:r>
               <a:rPr lang="en-GB" dirty="0" smtClean="0"/>
-              <a:t>Specifications:</a:t>
+              <a:t>UI</a:t>
             </a:r>
             <a:br>
               <a:rPr lang="en-GB" dirty="0" smtClean="0"/>
             </a:br>
             <a:r>
               <a:rPr lang="en-GB" dirty="0" smtClean="0"/>
-              <a:t>Development &amp; Testing</a:t>
-            </a:r>
-            <a:br>
-              <a:rPr lang="en-GB" dirty="0" smtClean="0"/>
-            </a:br>
-            <a:r>
-              <a:rPr lang="en-GB" sz="2000" dirty="0" smtClean="0"/>
-              <a:t>and effort estimates</a:t>
+              <a:t>(v4)</a:t>
             </a:r>
             <a:endParaRPr lang="en-GB" dirty="0"/>
           </a:p>
@@ -6806,20 +6688,138 @@
       </p:sp>
       <p:sp>
         <p:nvSpPr>
-          <p:cNvPr id="7" name="Rectangle 6"/>
+          <p:cNvPr id="10" name="Rectangle 9"/>
           <p:cNvSpPr/>
           <p:nvPr/>
         </p:nvSpPr>
         <p:spPr>
           <a:xfrm>
-            <a:off x="1860606" y="3228231"/>
-            <a:ext cx="620201" cy="159026"/>
+            <a:off x="3734357" y="4605131"/>
+            <a:ext cx="3228230" cy="124568"/>
           </a:xfrm>
           <a:prstGeom prst="rect">
             <a:avLst/>
           </a:prstGeom>
+        </p:spPr>
+        <p:style>
+          <a:lnRef idx="2">
+            <a:schemeClr val="accent1">
+              <a:shade val="50000"/>
+            </a:schemeClr>
+          </a:lnRef>
+          <a:fillRef idx="1">
+            <a:schemeClr val="accent1"/>
+          </a:fillRef>
+          <a:effectRef idx="0">
+            <a:schemeClr val="accent1"/>
+          </a:effectRef>
+          <a:fontRef idx="minor">
+            <a:schemeClr val="lt1"/>
+          </a:fontRef>
+        </p:style>
+        <p:txBody>
+          <a:bodyPr rtlCol="0" anchor="ctr"/>
+          <a:lstStyle/>
+          <a:p>
+            <a:pPr algn="ctr"/>
+            <a:endParaRPr lang="en-GB"/>
+          </a:p>
+        </p:txBody>
+      </p:sp>
+      <p:sp>
+        <p:nvSpPr>
+          <p:cNvPr id="11" name="Rectangle 10"/>
+          <p:cNvSpPr/>
+          <p:nvPr/>
+        </p:nvSpPr>
+        <p:spPr>
+          <a:xfrm>
+            <a:off x="5351228" y="5335325"/>
+            <a:ext cx="1311965" cy="127222"/>
+          </a:xfrm>
+          <a:prstGeom prst="rect">
+            <a:avLst/>
+          </a:prstGeom>
+        </p:spPr>
+        <p:style>
+          <a:lnRef idx="2">
+            <a:schemeClr val="accent1">
+              <a:shade val="50000"/>
+            </a:schemeClr>
+          </a:lnRef>
+          <a:fillRef idx="1">
+            <a:schemeClr val="accent1"/>
+          </a:fillRef>
+          <a:effectRef idx="0">
+            <a:schemeClr val="accent1"/>
+          </a:effectRef>
+          <a:fontRef idx="minor">
+            <a:schemeClr val="lt1"/>
+          </a:fontRef>
+        </p:style>
+        <p:txBody>
+          <a:bodyPr rtlCol="0" anchor="ctr"/>
+          <a:lstStyle/>
+          <a:p>
+            <a:pPr algn="ctr"/>
+            <a:endParaRPr lang="en-GB"/>
+          </a:p>
+        </p:txBody>
+      </p:sp>
+      <p:sp>
+        <p:nvSpPr>
+          <p:cNvPr id="12" name="TextBox 11"/>
+          <p:cNvSpPr txBox="1"/>
+          <p:nvPr/>
+        </p:nvSpPr>
+        <p:spPr>
+          <a:xfrm>
+            <a:off x="4102873" y="3593990"/>
+            <a:ext cx="1757238" cy="369332"/>
+          </a:xfrm>
+          <a:prstGeom prst="rect">
+            <a:avLst/>
+          </a:prstGeom>
+          <a:noFill/>
+        </p:spPr>
+        <p:txBody>
+          <a:bodyPr wrap="square" rtlCol="0">
+            <a:spAutoFit/>
+          </a:bodyPr>
+          <a:lstStyle/>
+          <a:p>
+            <a:r>
+              <a:rPr lang="en-GB" dirty="0" smtClean="0">
+                <a:solidFill>
+                  <a:schemeClr val="bg1"/>
+                </a:solidFill>
+              </a:rPr>
+              <a:t>Capacity:</a:t>
+            </a:r>
+            <a:endParaRPr lang="en-GB" dirty="0">
+              <a:solidFill>
+                <a:schemeClr val="bg1"/>
+              </a:solidFill>
+            </a:endParaRPr>
+          </a:p>
+        </p:txBody>
+      </p:sp>
+      <p:sp>
+        <p:nvSpPr>
+          <p:cNvPr id="5" name="Rounded Rectangle 4"/>
+          <p:cNvSpPr/>
+          <p:nvPr/>
+        </p:nvSpPr>
+        <p:spPr>
+          <a:xfrm>
+            <a:off x="2226365" y="1725433"/>
+            <a:ext cx="6742706" cy="4405023"/>
+          </a:xfrm>
+          <a:prstGeom prst="roundRect">
+            <a:avLst/>
+          </a:prstGeom>
           <a:solidFill>
-            <a:srgbClr val="C6EFCE"/>
+            <a:schemeClr val="tx1"/>
           </a:solidFill>
           <a:ln>
             <a:noFill/>
@@ -6852,13 +6852,15 @@
       </p:sp>
       <p:pic>
         <p:nvPicPr>
-          <p:cNvPr id="9" name="Picture 8"/>
+          <p:cNvPr id="4" name="Content Placeholder 3"/>
           <p:cNvPicPr>
-            <a:picLocks noChangeAspect="1"/>
+            <a:picLocks noGrp="1" noChangeAspect="1"/>
           </p:cNvPicPr>
-          <p:nvPr/>
+          <p:nvPr>
+            <p:ph idx="1"/>
+          </p:nvPr>
         </p:nvPicPr>
-        <p:blipFill rotWithShape="1">
+        <p:blipFill>
           <a:blip r:embed="rId2">
             <a:extLst>
               <a:ext uri="{28A0092B-C50C-407E-A947-70E740481C1C}">
@@ -6866,23 +6868,21 @@
               </a:ext>
             </a:extLst>
           </a:blip>
-          <a:srcRect l="4585" t="30075" r="19209" b="14133"/>
-          <a:stretch/>
+          <a:stretch>
+            <a:fillRect/>
+          </a:stretch>
         </p:blipFill>
         <p:spPr>
           <a:xfrm>
-            <a:off x="892600" y="2313417"/>
-            <a:ext cx="9404726" cy="3873110"/>
+            <a:off x="2857500" y="1975008"/>
+            <a:ext cx="5438775" cy="3619500"/>
           </a:xfrm>
-          <a:prstGeom prst="rect">
-            <a:avLst/>
-          </a:prstGeom>
         </p:spPr>
       </p:pic>
     </p:spTree>
     <p:extLst>
       <p:ext uri="{BB962C8B-B14F-4D97-AF65-F5344CB8AC3E}">
-        <p14:creationId xmlns:p14="http://schemas.microsoft.com/office/powerpoint/2010/main" val="337139409"/>
+        <p14:creationId xmlns:p14="http://schemas.microsoft.com/office/powerpoint/2010/main" val="1886001182"/>
       </p:ext>
     </p:extLst>
   </p:cSld>
@@ -6954,7 +6954,7 @@
         </p:nvSpPr>
         <p:spPr>
           <a:xfrm>
-            <a:off x="803081" y="1773142"/>
+            <a:off x="1049570" y="1518701"/>
             <a:ext cx="9454102" cy="4699814"/>
           </a:xfrm>
           <a:prstGeom prst="roundRect">
@@ -6963,6 +6963,9 @@
           <a:solidFill>
             <a:schemeClr val="tx1"/>
           </a:solidFill>
+          <a:ln>
+            <a:noFill/>
+          </a:ln>
         </p:spPr>
         <p:style>
           <a:lnRef idx="2">
@@ -6991,7 +6994,7 @@
       </p:sp>
       <p:pic>
         <p:nvPicPr>
-          <p:cNvPr id="10" name="Content Placeholder 9"/>
+          <p:cNvPr id="4" name="Content Placeholder 3"/>
           <p:cNvPicPr>
             <a:picLocks noGrp="1" noChangeAspect="1"/>
           </p:cNvPicPr>
@@ -7013,7 +7016,7 @@
         </p:blipFill>
         <p:spPr>
           <a:xfrm>
-            <a:off x="1103313" y="2457086"/>
+            <a:off x="1349802" y="2202645"/>
             <a:ext cx="8947150" cy="3386865"/>
           </a:xfrm>
         </p:spPr>

</xml_diff>

<commit_message>
v4: presentation & flow update
</commit_message>
<xml_diff>
--- a/v4/documentation/Presentation_v4.pptx
+++ b/v4/documentation/Presentation_v4.pptx
@@ -10,8 +10,11 @@
     <p:sldId id="260" r:id="rId4"/>
     <p:sldId id="258" r:id="rId5"/>
     <p:sldId id="261" r:id="rId6"/>
-    <p:sldId id="262" r:id="rId7"/>
-    <p:sldId id="259" r:id="rId8"/>
+    <p:sldId id="265" r:id="rId7"/>
+    <p:sldId id="262" r:id="rId8"/>
+    <p:sldId id="263" r:id="rId9"/>
+    <p:sldId id="259" r:id="rId10"/>
+    <p:sldId id="264" r:id="rId11"/>
   </p:sldIdLst>
   <p:sldSz cx="12192000" cy="6858000"/>
   <p:notesSz cx="6858000" cy="9144000"/>
@@ -6104,6 +6107,78 @@
 </p:sld>
 </file>
 
+<file path=ppt/slides/slide10.xml><?xml version="1.0" encoding="utf-8"?>
+<p:sld xmlns:a="http://schemas.openxmlformats.org/drawingml/2006/main" xmlns:r="http://schemas.openxmlformats.org/officeDocument/2006/relationships" xmlns:p="http://schemas.openxmlformats.org/presentationml/2006/main">
+  <p:cSld>
+    <p:spTree>
+      <p:nvGrpSpPr>
+        <p:cNvPr id="1" name=""/>
+        <p:cNvGrpSpPr/>
+        <p:nvPr/>
+      </p:nvGrpSpPr>
+      <p:grpSpPr>
+        <a:xfrm>
+          <a:off x="0" y="0"/>
+          <a:ext cx="0" cy="0"/>
+          <a:chOff x="0" y="0"/>
+          <a:chExt cx="0" cy="0"/>
+        </a:xfrm>
+      </p:grpSpPr>
+      <p:sp>
+        <p:nvSpPr>
+          <p:cNvPr id="2" name="Title 1"/>
+          <p:cNvSpPr>
+            <a:spLocks noGrp="1"/>
+          </p:cNvSpPr>
+          <p:nvPr>
+            <p:ph type="title"/>
+          </p:nvPr>
+        </p:nvSpPr>
+        <p:spPr/>
+        <p:txBody>
+          <a:bodyPr/>
+          <a:lstStyle/>
+          <a:p>
+            <a:r>
+              <a:rPr lang="en-GB" dirty="0" smtClean="0"/>
+              <a:t>Defects</a:t>
+            </a:r>
+            <a:endParaRPr lang="en-GB" dirty="0"/>
+          </a:p>
+        </p:txBody>
+      </p:sp>
+      <p:sp>
+        <p:nvSpPr>
+          <p:cNvPr id="3" name="Content Placeholder 2"/>
+          <p:cNvSpPr>
+            <a:spLocks noGrp="1"/>
+          </p:cNvSpPr>
+          <p:nvPr>
+            <p:ph idx="1"/>
+          </p:nvPr>
+        </p:nvSpPr>
+        <p:spPr/>
+        <p:txBody>
+          <a:bodyPr/>
+          <a:lstStyle/>
+          <a:p>
+            <a:endParaRPr lang="en-GB"/>
+          </a:p>
+        </p:txBody>
+      </p:sp>
+    </p:spTree>
+    <p:extLst>
+      <p:ext uri="{BB962C8B-B14F-4D97-AF65-F5344CB8AC3E}">
+        <p14:creationId xmlns:p14="http://schemas.microsoft.com/office/powerpoint/2010/main" val="3992733730"/>
+      </p:ext>
+    </p:extLst>
+  </p:cSld>
+  <p:clrMapOvr>
+    <a:masterClrMapping/>
+  </p:clrMapOvr>
+</p:sld>
+</file>
+
 <file path=ppt/slides/slide2.xml><?xml version="1.0" encoding="utf-8"?>
 <p:sld xmlns:a="http://schemas.openxmlformats.org/drawingml/2006/main" xmlns:r="http://schemas.openxmlformats.org/officeDocument/2006/relationships" xmlns:p="http://schemas.openxmlformats.org/presentationml/2006/main">
   <p:cSld>
@@ -6679,10 +6754,10 @@
               <a:rPr lang="en-GB" dirty="0" smtClean="0"/>
             </a:br>
             <a:r>
-              <a:rPr lang="en-GB" dirty="0" smtClean="0"/>
+              <a:rPr lang="en-GB" sz="2000" dirty="0" smtClean="0"/>
               <a:t>(v4)</a:t>
             </a:r>
-            <a:endParaRPr lang="en-GB" dirty="0"/>
+            <a:endParaRPr lang="en-GB" sz="2400" dirty="0"/>
           </a:p>
         </p:txBody>
       </p:sp>
@@ -6812,11 +6887,13 @@
         </p:nvSpPr>
         <p:spPr>
           <a:xfrm>
-            <a:off x="2226365" y="1725433"/>
-            <a:ext cx="6742706" cy="4405023"/>
+            <a:off x="2464905" y="1876511"/>
+            <a:ext cx="6217920" cy="3975652"/>
           </a:xfrm>
           <a:prstGeom prst="roundRect">
-            <a:avLst/>
+            <a:avLst>
+              <a:gd name="adj" fmla="val 3490"/>
+            </a:avLst>
           </a:prstGeom>
           <a:solidFill>
             <a:schemeClr val="tx1"/>
@@ -6933,16 +7010,282 @@
           <a:p>
             <a:r>
               <a:rPr lang="en-GB" dirty="0" smtClean="0"/>
-              <a:t>Flow Diagram</a:t>
+              <a:t>UI</a:t>
             </a:r>
             <a:br>
               <a:rPr lang="en-GB" dirty="0" smtClean="0"/>
             </a:br>
             <a:r>
+              <a:rPr lang="en-GB" sz="2000" dirty="0" smtClean="0"/>
+              <a:t>(</a:t>
+            </a:r>
+            <a:r>
+              <a:rPr lang="en-GB" sz="2000" dirty="0" smtClean="0"/>
+              <a:t>v4 redesign)</a:t>
+            </a:r>
+            <a:endParaRPr lang="en-GB" sz="2000" dirty="0"/>
+          </a:p>
+        </p:txBody>
+      </p:sp>
+      <p:sp>
+        <p:nvSpPr>
+          <p:cNvPr id="10" name="Rectangle 9"/>
+          <p:cNvSpPr/>
+          <p:nvPr/>
+        </p:nvSpPr>
+        <p:spPr>
+          <a:xfrm>
+            <a:off x="3734357" y="4605131"/>
+            <a:ext cx="3228230" cy="124568"/>
+          </a:xfrm>
+          <a:prstGeom prst="rect">
+            <a:avLst/>
+          </a:prstGeom>
+        </p:spPr>
+        <p:style>
+          <a:lnRef idx="2">
+            <a:schemeClr val="accent1">
+              <a:shade val="50000"/>
+            </a:schemeClr>
+          </a:lnRef>
+          <a:fillRef idx="1">
+            <a:schemeClr val="accent1"/>
+          </a:fillRef>
+          <a:effectRef idx="0">
+            <a:schemeClr val="accent1"/>
+          </a:effectRef>
+          <a:fontRef idx="minor">
+            <a:schemeClr val="lt1"/>
+          </a:fontRef>
+        </p:style>
+        <p:txBody>
+          <a:bodyPr rtlCol="0" anchor="ctr"/>
+          <a:lstStyle/>
+          <a:p>
+            <a:pPr algn="ctr"/>
+            <a:endParaRPr lang="en-GB"/>
+          </a:p>
+        </p:txBody>
+      </p:sp>
+      <p:sp>
+        <p:nvSpPr>
+          <p:cNvPr id="11" name="Rectangle 10"/>
+          <p:cNvSpPr/>
+          <p:nvPr/>
+        </p:nvSpPr>
+        <p:spPr>
+          <a:xfrm>
+            <a:off x="5351228" y="5335325"/>
+            <a:ext cx="1311965" cy="127222"/>
+          </a:xfrm>
+          <a:prstGeom prst="rect">
+            <a:avLst/>
+          </a:prstGeom>
+        </p:spPr>
+        <p:style>
+          <a:lnRef idx="2">
+            <a:schemeClr val="accent1">
+              <a:shade val="50000"/>
+            </a:schemeClr>
+          </a:lnRef>
+          <a:fillRef idx="1">
+            <a:schemeClr val="accent1"/>
+          </a:fillRef>
+          <a:effectRef idx="0">
+            <a:schemeClr val="accent1"/>
+          </a:effectRef>
+          <a:fontRef idx="minor">
+            <a:schemeClr val="lt1"/>
+          </a:fontRef>
+        </p:style>
+        <p:txBody>
+          <a:bodyPr rtlCol="0" anchor="ctr"/>
+          <a:lstStyle/>
+          <a:p>
+            <a:pPr algn="ctr"/>
+            <a:endParaRPr lang="en-GB"/>
+          </a:p>
+        </p:txBody>
+      </p:sp>
+      <p:sp>
+        <p:nvSpPr>
+          <p:cNvPr id="12" name="TextBox 11"/>
+          <p:cNvSpPr txBox="1"/>
+          <p:nvPr/>
+        </p:nvSpPr>
+        <p:spPr>
+          <a:xfrm>
+            <a:off x="4102873" y="3593990"/>
+            <a:ext cx="1757238" cy="369332"/>
+          </a:xfrm>
+          <a:prstGeom prst="rect">
+            <a:avLst/>
+          </a:prstGeom>
+          <a:noFill/>
+        </p:spPr>
+        <p:txBody>
+          <a:bodyPr wrap="square" rtlCol="0">
+            <a:spAutoFit/>
+          </a:bodyPr>
+          <a:lstStyle/>
+          <a:p>
+            <a:r>
+              <a:rPr lang="en-GB" dirty="0" smtClean="0">
+                <a:solidFill>
+                  <a:schemeClr val="bg1"/>
+                </a:solidFill>
+              </a:rPr>
+              <a:t>Capacity:</a:t>
+            </a:r>
+            <a:endParaRPr lang="en-GB" dirty="0">
+              <a:solidFill>
+                <a:schemeClr val="bg1"/>
+              </a:solidFill>
+            </a:endParaRPr>
+          </a:p>
+        </p:txBody>
+      </p:sp>
+      <p:sp>
+        <p:nvSpPr>
+          <p:cNvPr id="5" name="Rounded Rectangle 4"/>
+          <p:cNvSpPr/>
+          <p:nvPr/>
+        </p:nvSpPr>
+        <p:spPr>
+          <a:xfrm>
+            <a:off x="2297926" y="1853248"/>
+            <a:ext cx="6599584" cy="4213598"/>
+          </a:xfrm>
+          <a:prstGeom prst="roundRect">
+            <a:avLst>
+              <a:gd name="adj" fmla="val 2768"/>
+            </a:avLst>
+          </a:prstGeom>
+          <a:solidFill>
+            <a:schemeClr val="tx1"/>
+          </a:solidFill>
+          <a:ln>
+            <a:noFill/>
+          </a:ln>
+        </p:spPr>
+        <p:style>
+          <a:lnRef idx="2">
+            <a:schemeClr val="accent1">
+              <a:shade val="50000"/>
+            </a:schemeClr>
+          </a:lnRef>
+          <a:fillRef idx="1">
+            <a:schemeClr val="accent1"/>
+          </a:fillRef>
+          <a:effectRef idx="0">
+            <a:schemeClr val="accent1"/>
+          </a:effectRef>
+          <a:fontRef idx="minor">
+            <a:schemeClr val="lt1"/>
+          </a:fontRef>
+        </p:style>
+        <p:txBody>
+          <a:bodyPr rtlCol="0" anchor="ctr"/>
+          <a:lstStyle/>
+          <a:p>
+            <a:pPr algn="ctr"/>
+            <a:endParaRPr lang="en-GB"/>
+          </a:p>
+        </p:txBody>
+      </p:sp>
+      <p:pic>
+        <p:nvPicPr>
+          <p:cNvPr id="13" name="Content Placeholder 12"/>
+          <p:cNvPicPr>
+            <a:picLocks noGrp="1" noChangeAspect="1"/>
+          </p:cNvPicPr>
+          <p:nvPr>
+            <p:ph idx="1"/>
+          </p:nvPr>
+        </p:nvPicPr>
+        <p:blipFill>
+          <a:blip r:embed="rId2">
+            <a:extLst>
+              <a:ext uri="{28A0092B-C50C-407E-A947-70E740481C1C}">
+                <a14:useLocalDpi xmlns:a14="http://schemas.microsoft.com/office/drawing/2010/main" val="0"/>
+              </a:ext>
+            </a:extLst>
+          </a:blip>
+          <a:stretch>
+            <a:fillRect/>
+          </a:stretch>
+        </p:blipFill>
+        <p:spPr>
+          <a:xfrm>
+            <a:off x="2476500" y="2010249"/>
+            <a:ext cx="6200775" cy="3914775"/>
+          </a:xfrm>
+        </p:spPr>
+      </p:pic>
+    </p:spTree>
+    <p:extLst>
+      <p:ext uri="{BB962C8B-B14F-4D97-AF65-F5344CB8AC3E}">
+        <p14:creationId xmlns:p14="http://schemas.microsoft.com/office/powerpoint/2010/main" val="4086672945"/>
+      </p:ext>
+    </p:extLst>
+  </p:cSld>
+  <p:clrMapOvr>
+    <a:masterClrMapping/>
+  </p:clrMapOvr>
+  <p:timing>
+    <p:tnLst>
+      <p:par>
+        <p:cTn id="1" dur="indefinite" restart="never" nodeType="tmRoot"/>
+      </p:par>
+    </p:tnLst>
+  </p:timing>
+</p:sld>
+</file>
+
+<file path=ppt/slides/slide7.xml><?xml version="1.0" encoding="utf-8"?>
+<p:sld xmlns:a="http://schemas.openxmlformats.org/drawingml/2006/main" xmlns:r="http://schemas.openxmlformats.org/officeDocument/2006/relationships" xmlns:p="http://schemas.openxmlformats.org/presentationml/2006/main">
+  <p:cSld>
+    <p:spTree>
+      <p:nvGrpSpPr>
+        <p:cNvPr id="1" name=""/>
+        <p:cNvGrpSpPr/>
+        <p:nvPr/>
+      </p:nvGrpSpPr>
+      <p:grpSpPr>
+        <a:xfrm>
+          <a:off x="0" y="0"/>
+          <a:ext cx="0" cy="0"/>
+          <a:chOff x="0" y="0"/>
+          <a:chExt cx="0" cy="0"/>
+        </a:xfrm>
+      </p:grpSpPr>
+      <p:sp>
+        <p:nvSpPr>
+          <p:cNvPr id="2" name="Title 1"/>
+          <p:cNvSpPr>
+            <a:spLocks noGrp="1"/>
+          </p:cNvSpPr>
+          <p:nvPr>
+            <p:ph type="title"/>
+          </p:nvPr>
+        </p:nvSpPr>
+        <p:spPr/>
+        <p:txBody>
+          <a:bodyPr/>
+          <a:lstStyle/>
+          <a:p>
+            <a:r>
               <a:rPr lang="en-GB" dirty="0" smtClean="0"/>
+              <a:t>Flow Diagram</a:t>
+            </a:r>
+            <a:br>
+              <a:rPr lang="en-GB" dirty="0" smtClean="0"/>
+            </a:br>
+            <a:r>
+              <a:rPr lang="en-GB" sz="2000" dirty="0" smtClean="0"/>
               <a:t>(v4)</a:t>
             </a:r>
-            <a:endParaRPr lang="en-GB" dirty="0"/>
+            <a:endParaRPr lang="en-GB" sz="2000" dirty="0"/>
           </a:p>
         </p:txBody>
       </p:sp>
@@ -6994,7 +7337,7 @@
       </p:sp>
       <p:pic>
         <p:nvPicPr>
-          <p:cNvPr id="4" name="Content Placeholder 3"/>
+          <p:cNvPr id="9" name="Content Placeholder 8"/>
           <p:cNvPicPr>
             <a:picLocks noGrp="1" noChangeAspect="1"/>
           </p:cNvPicPr>
@@ -7016,8 +7359,8 @@
         </p:blipFill>
         <p:spPr>
           <a:xfrm>
-            <a:off x="1349802" y="2202645"/>
-            <a:ext cx="8947150" cy="3386865"/>
+            <a:off x="1303046" y="2296761"/>
+            <a:ext cx="8947150" cy="3143694"/>
           </a:xfrm>
         </p:spPr>
       </p:pic>
@@ -7034,7 +7377,79 @@
 </p:sld>
 </file>
 
-<file path=ppt/slides/slide7.xml><?xml version="1.0" encoding="utf-8"?>
+<file path=ppt/slides/slide8.xml><?xml version="1.0" encoding="utf-8"?>
+<p:sld xmlns:a="http://schemas.openxmlformats.org/drawingml/2006/main" xmlns:r="http://schemas.openxmlformats.org/officeDocument/2006/relationships" xmlns:p="http://schemas.openxmlformats.org/presentationml/2006/main">
+  <p:cSld>
+    <p:spTree>
+      <p:nvGrpSpPr>
+        <p:cNvPr id="1" name=""/>
+        <p:cNvGrpSpPr/>
+        <p:nvPr/>
+      </p:nvGrpSpPr>
+      <p:grpSpPr>
+        <a:xfrm>
+          <a:off x="0" y="0"/>
+          <a:ext cx="0" cy="0"/>
+          <a:chOff x="0" y="0"/>
+          <a:chExt cx="0" cy="0"/>
+        </a:xfrm>
+      </p:grpSpPr>
+      <p:sp>
+        <p:nvSpPr>
+          <p:cNvPr id="2" name="Title 1"/>
+          <p:cNvSpPr>
+            <a:spLocks noGrp="1"/>
+          </p:cNvSpPr>
+          <p:nvPr>
+            <p:ph type="title"/>
+          </p:nvPr>
+        </p:nvSpPr>
+        <p:spPr/>
+        <p:txBody>
+          <a:bodyPr/>
+          <a:lstStyle/>
+          <a:p>
+            <a:r>
+              <a:rPr lang="en-GB" dirty="0" smtClean="0"/>
+              <a:t>Demo</a:t>
+            </a:r>
+            <a:endParaRPr lang="en-GB" dirty="0"/>
+          </a:p>
+        </p:txBody>
+      </p:sp>
+      <p:sp>
+        <p:nvSpPr>
+          <p:cNvPr id="3" name="Content Placeholder 2"/>
+          <p:cNvSpPr>
+            <a:spLocks noGrp="1"/>
+          </p:cNvSpPr>
+          <p:nvPr>
+            <p:ph idx="1"/>
+          </p:nvPr>
+        </p:nvSpPr>
+        <p:spPr/>
+        <p:txBody>
+          <a:bodyPr/>
+          <a:lstStyle/>
+          <a:p>
+            <a:endParaRPr lang="en-GB"/>
+          </a:p>
+        </p:txBody>
+      </p:sp>
+    </p:spTree>
+    <p:extLst>
+      <p:ext uri="{BB962C8B-B14F-4D97-AF65-F5344CB8AC3E}">
+        <p14:creationId xmlns:p14="http://schemas.microsoft.com/office/powerpoint/2010/main" val="115019964"/>
+      </p:ext>
+    </p:extLst>
+  </p:cSld>
+  <p:clrMapOvr>
+    <a:masterClrMapping/>
+  </p:clrMapOvr>
+</p:sld>
+</file>
+
+<file path=ppt/slides/slide9.xml><?xml version="1.0" encoding="utf-8"?>
 <p:sld xmlns:a="http://schemas.openxmlformats.org/drawingml/2006/main" xmlns:r="http://schemas.openxmlformats.org/officeDocument/2006/relationships" xmlns:p="http://schemas.openxmlformats.org/presentationml/2006/main">
   <p:cSld>
     <p:spTree>

</xml_diff>